<commit_message>
Seoho's model section uploadaded
</commit_message>
<xml_diff>
--- a/doc/Figures_Seoho/Figures.pptx
+++ b/doc/Figures_Seoho/Figures.pptx
@@ -8,6 +8,9 @@
     <p:sldId id="256" r:id="rId2"/>
     <p:sldId id="257" r:id="rId3"/>
     <p:sldId id="258" r:id="rId4"/>
+    <p:sldId id="259" r:id="rId5"/>
+    <p:sldId id="260" r:id="rId6"/>
+    <p:sldId id="261" r:id="rId7"/>
   </p:sldIdLst>
   <p:sldSz cx="12192000" cy="6858000"/>
   <p:notesSz cx="6858000" cy="9144000"/>
@@ -245,7 +248,7 @@
           <a:p>
             <a:fld id="{64910B20-29D8-E242-9D57-1BAEDE460CF4}" type="datetimeFigureOut">
               <a:rPr lang="en-US" smtClean="0"/>
-              <a:t>12/5/15</a:t>
+              <a:t>12/10/15</a:t>
             </a:fld>
             <a:endParaRPr lang="en-US"/>
           </a:p>
@@ -415,7 +418,7 @@
           <a:p>
             <a:fld id="{64910B20-29D8-E242-9D57-1BAEDE460CF4}" type="datetimeFigureOut">
               <a:rPr lang="en-US" smtClean="0"/>
-              <a:t>12/5/15</a:t>
+              <a:t>12/10/15</a:t>
             </a:fld>
             <a:endParaRPr lang="en-US"/>
           </a:p>
@@ -595,7 +598,7 @@
           <a:p>
             <a:fld id="{64910B20-29D8-E242-9D57-1BAEDE460CF4}" type="datetimeFigureOut">
               <a:rPr lang="en-US" smtClean="0"/>
-              <a:t>12/5/15</a:t>
+              <a:t>12/10/15</a:t>
             </a:fld>
             <a:endParaRPr lang="en-US"/>
           </a:p>
@@ -765,7 +768,7 @@
           <a:p>
             <a:fld id="{64910B20-29D8-E242-9D57-1BAEDE460CF4}" type="datetimeFigureOut">
               <a:rPr lang="en-US" smtClean="0"/>
-              <a:t>12/5/15</a:t>
+              <a:t>12/10/15</a:t>
             </a:fld>
             <a:endParaRPr lang="en-US"/>
           </a:p>
@@ -1011,7 +1014,7 @@
           <a:p>
             <a:fld id="{64910B20-29D8-E242-9D57-1BAEDE460CF4}" type="datetimeFigureOut">
               <a:rPr lang="en-US" smtClean="0"/>
-              <a:t>12/5/15</a:t>
+              <a:t>12/10/15</a:t>
             </a:fld>
             <a:endParaRPr lang="en-US"/>
           </a:p>
@@ -1243,7 +1246,7 @@
           <a:p>
             <a:fld id="{64910B20-29D8-E242-9D57-1BAEDE460CF4}" type="datetimeFigureOut">
               <a:rPr lang="en-US" smtClean="0"/>
-              <a:t>12/5/15</a:t>
+              <a:t>12/10/15</a:t>
             </a:fld>
             <a:endParaRPr lang="en-US"/>
           </a:p>
@@ -1610,7 +1613,7 @@
           <a:p>
             <a:fld id="{64910B20-29D8-E242-9D57-1BAEDE460CF4}" type="datetimeFigureOut">
               <a:rPr lang="en-US" smtClean="0"/>
-              <a:t>12/5/15</a:t>
+              <a:t>12/10/15</a:t>
             </a:fld>
             <a:endParaRPr lang="en-US"/>
           </a:p>
@@ -1728,7 +1731,7 @@
           <a:p>
             <a:fld id="{64910B20-29D8-E242-9D57-1BAEDE460CF4}" type="datetimeFigureOut">
               <a:rPr lang="en-US" smtClean="0"/>
-              <a:t>12/5/15</a:t>
+              <a:t>12/10/15</a:t>
             </a:fld>
             <a:endParaRPr lang="en-US"/>
           </a:p>
@@ -1823,7 +1826,7 @@
           <a:p>
             <a:fld id="{64910B20-29D8-E242-9D57-1BAEDE460CF4}" type="datetimeFigureOut">
               <a:rPr lang="en-US" smtClean="0"/>
-              <a:t>12/5/15</a:t>
+              <a:t>12/10/15</a:t>
             </a:fld>
             <a:endParaRPr lang="en-US"/>
           </a:p>
@@ -2100,7 +2103,7 @@
           <a:p>
             <a:fld id="{64910B20-29D8-E242-9D57-1BAEDE460CF4}" type="datetimeFigureOut">
               <a:rPr lang="en-US" smtClean="0"/>
-              <a:t>12/5/15</a:t>
+              <a:t>12/10/15</a:t>
             </a:fld>
             <a:endParaRPr lang="en-US"/>
           </a:p>
@@ -2353,7 +2356,7 @@
           <a:p>
             <a:fld id="{64910B20-29D8-E242-9D57-1BAEDE460CF4}" type="datetimeFigureOut">
               <a:rPr lang="en-US" smtClean="0"/>
-              <a:t>12/5/15</a:t>
+              <a:t>12/10/15</a:t>
             </a:fld>
             <a:endParaRPr lang="en-US"/>
           </a:p>
@@ -2566,7 +2569,7 @@
           <a:p>
             <a:fld id="{64910B20-29D8-E242-9D57-1BAEDE460CF4}" type="datetimeFigureOut">
               <a:rPr lang="en-US" smtClean="0"/>
-              <a:t>12/5/15</a:t>
+              <a:t>12/10/15</a:t>
             </a:fld>
             <a:endParaRPr lang="en-US"/>
           </a:p>
@@ -5304,6 +5307,2554 @@
 </p:sld>
 </file>
 
+<file path=ppt/slides/slide4.xml><?xml version="1.0" encoding="utf-8"?>
+<p:sld xmlns:a="http://schemas.openxmlformats.org/drawingml/2006/main" xmlns:r="http://schemas.openxmlformats.org/officeDocument/2006/relationships" xmlns:p="http://schemas.openxmlformats.org/presentationml/2006/main">
+  <p:cSld>
+    <p:spTree>
+      <p:nvGrpSpPr>
+        <p:cNvPr id="1" name=""/>
+        <p:cNvGrpSpPr/>
+        <p:nvPr/>
+      </p:nvGrpSpPr>
+      <p:grpSpPr>
+        <a:xfrm>
+          <a:off x="0" y="0"/>
+          <a:ext cx="0" cy="0"/>
+          <a:chOff x="0" y="0"/>
+          <a:chExt cx="0" cy="0"/>
+        </a:xfrm>
+      </p:grpSpPr>
+      <p:grpSp>
+        <p:nvGrpSpPr>
+          <p:cNvPr id="47" name="Group 46"/>
+          <p:cNvGrpSpPr/>
+          <p:nvPr/>
+        </p:nvGrpSpPr>
+        <p:grpSpPr>
+          <a:xfrm>
+            <a:off x="1557353" y="97885"/>
+            <a:ext cx="9356998" cy="5735357"/>
+            <a:chOff x="1557353" y="97885"/>
+            <a:chExt cx="9356998" cy="5735357"/>
+          </a:xfrm>
+        </p:grpSpPr>
+        <p:cxnSp>
+          <p:nvCxnSpPr>
+            <p:cNvPr id="46" name="Straight Arrow Connector 45"/>
+            <p:cNvCxnSpPr/>
+            <p:nvPr/>
+          </p:nvCxnSpPr>
+          <p:spPr>
+            <a:xfrm>
+              <a:off x="3034816" y="2140795"/>
+              <a:ext cx="0" cy="617871"/>
+            </a:xfrm>
+            <a:prstGeom prst="straightConnector1">
+              <a:avLst/>
+            </a:prstGeom>
+            <a:ln w="50800">
+              <a:solidFill>
+                <a:srgbClr val="00B050"/>
+              </a:solidFill>
+              <a:tailEnd type="triangle"/>
+            </a:ln>
+          </p:spPr>
+          <p:style>
+            <a:lnRef idx="1">
+              <a:schemeClr val="accent1"/>
+            </a:lnRef>
+            <a:fillRef idx="0">
+              <a:schemeClr val="accent1"/>
+            </a:fillRef>
+            <a:effectRef idx="0">
+              <a:schemeClr val="accent1"/>
+            </a:effectRef>
+            <a:fontRef idx="minor">
+              <a:schemeClr val="tx1"/>
+            </a:fontRef>
+          </p:style>
+        </p:cxnSp>
+        <p:cxnSp>
+          <p:nvCxnSpPr>
+            <p:cNvPr id="45" name="Straight Arrow Connector 44"/>
+            <p:cNvCxnSpPr/>
+            <p:nvPr/>
+          </p:nvCxnSpPr>
+          <p:spPr>
+            <a:xfrm>
+              <a:off x="9498678" y="2140795"/>
+              <a:ext cx="0" cy="617871"/>
+            </a:xfrm>
+            <a:prstGeom prst="straightConnector1">
+              <a:avLst/>
+            </a:prstGeom>
+            <a:ln w="50800">
+              <a:solidFill>
+                <a:srgbClr val="00B050"/>
+              </a:solidFill>
+              <a:tailEnd type="triangle"/>
+            </a:ln>
+          </p:spPr>
+          <p:style>
+            <a:lnRef idx="1">
+              <a:schemeClr val="accent1"/>
+            </a:lnRef>
+            <a:fillRef idx="0">
+              <a:schemeClr val="accent1"/>
+            </a:fillRef>
+            <a:effectRef idx="0">
+              <a:schemeClr val="accent1"/>
+            </a:effectRef>
+            <a:fontRef idx="minor">
+              <a:schemeClr val="tx1"/>
+            </a:fontRef>
+          </p:style>
+        </p:cxnSp>
+        <p:cxnSp>
+          <p:nvCxnSpPr>
+            <p:cNvPr id="42" name="Straight Arrow Connector 41"/>
+            <p:cNvCxnSpPr/>
+            <p:nvPr/>
+          </p:nvCxnSpPr>
+          <p:spPr>
+            <a:xfrm>
+              <a:off x="6303534" y="2140795"/>
+              <a:ext cx="0" cy="617871"/>
+            </a:xfrm>
+            <a:prstGeom prst="straightConnector1">
+              <a:avLst/>
+            </a:prstGeom>
+            <a:ln w="50800">
+              <a:solidFill>
+                <a:srgbClr val="00B050"/>
+              </a:solidFill>
+              <a:tailEnd type="triangle"/>
+            </a:ln>
+          </p:spPr>
+          <p:style>
+            <a:lnRef idx="1">
+              <a:schemeClr val="accent1"/>
+            </a:lnRef>
+            <a:fillRef idx="0">
+              <a:schemeClr val="accent1"/>
+            </a:fillRef>
+            <a:effectRef idx="0">
+              <a:schemeClr val="accent1"/>
+            </a:effectRef>
+            <a:fontRef idx="minor">
+              <a:schemeClr val="tx1"/>
+            </a:fontRef>
+          </p:style>
+        </p:cxnSp>
+        <p:grpSp>
+          <p:nvGrpSpPr>
+            <p:cNvPr id="27" name="Group 26"/>
+            <p:cNvGrpSpPr/>
+            <p:nvPr/>
+          </p:nvGrpSpPr>
+          <p:grpSpPr>
+            <a:xfrm>
+              <a:off x="1557353" y="1428275"/>
+              <a:ext cx="6143463" cy="712522"/>
+              <a:chOff x="1557353" y="1428275"/>
+              <a:chExt cx="6143463" cy="712522"/>
+            </a:xfrm>
+          </p:grpSpPr>
+          <p:grpSp>
+            <p:nvGrpSpPr>
+              <p:cNvPr id="12" name="Group 11"/>
+              <p:cNvGrpSpPr/>
+              <p:nvPr/>
+            </p:nvGrpSpPr>
+            <p:grpSpPr>
+              <a:xfrm>
+                <a:off x="1557353" y="1428277"/>
+                <a:ext cx="2929928" cy="712520"/>
+                <a:chOff x="3386153" y="46166"/>
+                <a:chExt cx="2929928" cy="712520"/>
+              </a:xfrm>
+              <a:noFill/>
+            </p:grpSpPr>
+            <p:sp>
+              <p:nvSpPr>
+                <p:cNvPr id="13" name="Rectangle 12"/>
+                <p:cNvSpPr/>
+                <p:nvPr/>
+              </p:nvSpPr>
+              <p:spPr>
+                <a:xfrm>
+                  <a:off x="3386153" y="46166"/>
+                  <a:ext cx="2929928" cy="712520"/>
+                </a:xfrm>
+                <a:prstGeom prst="rect">
+                  <a:avLst/>
+                </a:prstGeom>
+                <a:grpFill/>
+                <a:ln w="50800">
+                  <a:solidFill>
+                    <a:srgbClr val="0070C0"/>
+                  </a:solidFill>
+                </a:ln>
+              </p:spPr>
+              <p:style>
+                <a:lnRef idx="2">
+                  <a:schemeClr val="accent1">
+                    <a:shade val="50000"/>
+                  </a:schemeClr>
+                </a:lnRef>
+                <a:fillRef idx="1">
+                  <a:schemeClr val="accent1"/>
+                </a:fillRef>
+                <a:effectRef idx="0">
+                  <a:schemeClr val="accent1"/>
+                </a:effectRef>
+                <a:fontRef idx="minor">
+                  <a:schemeClr val="lt1"/>
+                </a:fontRef>
+              </p:style>
+              <p:txBody>
+                <a:bodyPr rtlCol="0" anchor="ctr"/>
+                <a:lstStyle/>
+                <a:p>
+                  <a:pPr algn="ctr"/>
+                  <a:endParaRPr lang="en-US"/>
+                </a:p>
+              </p:txBody>
+            </p:sp>
+            <p:sp>
+              <p:nvSpPr>
+                <p:cNvPr id="14" name="TextBox 13"/>
+                <p:cNvSpPr txBox="1"/>
+                <p:nvPr/>
+              </p:nvSpPr>
+              <p:spPr>
+                <a:xfrm>
+                  <a:off x="3474855" y="171594"/>
+                  <a:ext cx="2752524" cy="461665"/>
+                </a:xfrm>
+                <a:prstGeom prst="rect">
+                  <a:avLst/>
+                </a:prstGeom>
+                <a:grpFill/>
+              </p:spPr>
+              <p:txBody>
+                <a:bodyPr wrap="square" rtlCol="0">
+                  <a:spAutoFit/>
+                </a:bodyPr>
+                <a:lstStyle/>
+                <a:p>
+                  <a:pPr algn="ctr"/>
+                  <a:r>
+                    <a:rPr lang="en-US" sz="2400" dirty="0" smtClean="0">
+                      <a:latin typeface="Arial" charset="0"/>
+                      <a:ea typeface="Arial" charset="0"/>
+                      <a:cs typeface="Arial" charset="0"/>
+                    </a:rPr>
+                    <a:t>Speed</a:t>
+                  </a:r>
+                  <a:endParaRPr lang="en-US" sz="2400" dirty="0">
+                    <a:latin typeface="Arial" charset="0"/>
+                    <a:ea typeface="Arial" charset="0"/>
+                    <a:cs typeface="Arial" charset="0"/>
+                  </a:endParaRPr>
+                </a:p>
+              </p:txBody>
+            </p:sp>
+          </p:grpSp>
+          <p:grpSp>
+            <p:nvGrpSpPr>
+              <p:cNvPr id="15" name="Group 14"/>
+              <p:cNvGrpSpPr/>
+              <p:nvPr/>
+            </p:nvGrpSpPr>
+            <p:grpSpPr>
+              <a:xfrm>
+                <a:off x="4770888" y="1428275"/>
+                <a:ext cx="2929928" cy="712520"/>
+                <a:chOff x="3386153" y="46166"/>
+                <a:chExt cx="2929928" cy="712520"/>
+              </a:xfrm>
+              <a:noFill/>
+            </p:grpSpPr>
+            <p:sp>
+              <p:nvSpPr>
+                <p:cNvPr id="16" name="Rectangle 15"/>
+                <p:cNvSpPr/>
+                <p:nvPr/>
+              </p:nvSpPr>
+              <p:spPr>
+                <a:xfrm>
+                  <a:off x="3386153" y="46166"/>
+                  <a:ext cx="2929928" cy="712520"/>
+                </a:xfrm>
+                <a:prstGeom prst="rect">
+                  <a:avLst/>
+                </a:prstGeom>
+                <a:grpFill/>
+                <a:ln w="50800">
+                  <a:solidFill>
+                    <a:srgbClr val="0070C0"/>
+                  </a:solidFill>
+                </a:ln>
+              </p:spPr>
+              <p:style>
+                <a:lnRef idx="2">
+                  <a:schemeClr val="accent1">
+                    <a:shade val="50000"/>
+                  </a:schemeClr>
+                </a:lnRef>
+                <a:fillRef idx="1">
+                  <a:schemeClr val="accent1"/>
+                </a:fillRef>
+                <a:effectRef idx="0">
+                  <a:schemeClr val="accent1"/>
+                </a:effectRef>
+                <a:fontRef idx="minor">
+                  <a:schemeClr val="lt1"/>
+                </a:fontRef>
+              </p:style>
+              <p:txBody>
+                <a:bodyPr rtlCol="0" anchor="ctr"/>
+                <a:lstStyle/>
+                <a:p>
+                  <a:pPr algn="ctr"/>
+                  <a:endParaRPr lang="en-US"/>
+                </a:p>
+              </p:txBody>
+            </p:sp>
+            <p:sp>
+              <p:nvSpPr>
+                <p:cNvPr id="17" name="TextBox 16"/>
+                <p:cNvSpPr txBox="1"/>
+                <p:nvPr/>
+              </p:nvSpPr>
+              <p:spPr>
+                <a:xfrm>
+                  <a:off x="3474855" y="171594"/>
+                  <a:ext cx="2752524" cy="461665"/>
+                </a:xfrm>
+                <a:prstGeom prst="rect">
+                  <a:avLst/>
+                </a:prstGeom>
+                <a:grpFill/>
+              </p:spPr>
+              <p:txBody>
+                <a:bodyPr wrap="square" rtlCol="0">
+                  <a:spAutoFit/>
+                </a:bodyPr>
+                <a:lstStyle/>
+                <a:p>
+                  <a:pPr algn="ctr"/>
+                  <a:r>
+                    <a:rPr lang="en-US" sz="2400" dirty="0" smtClean="0">
+                      <a:latin typeface="Arial" charset="0"/>
+                      <a:ea typeface="Arial" charset="0"/>
+                      <a:cs typeface="Arial" charset="0"/>
+                    </a:rPr>
+                    <a:t>Location</a:t>
+                  </a:r>
+                  <a:endParaRPr lang="en-US" sz="2400" dirty="0">
+                    <a:latin typeface="Arial" charset="0"/>
+                    <a:ea typeface="Arial" charset="0"/>
+                    <a:cs typeface="Arial" charset="0"/>
+                  </a:endParaRPr>
+                </a:p>
+              </p:txBody>
+            </p:sp>
+          </p:grpSp>
+        </p:grpSp>
+        <p:grpSp>
+          <p:nvGrpSpPr>
+            <p:cNvPr id="18" name="Group 17"/>
+            <p:cNvGrpSpPr/>
+            <p:nvPr/>
+          </p:nvGrpSpPr>
+          <p:grpSpPr>
+            <a:xfrm>
+              <a:off x="7984423" y="678728"/>
+              <a:ext cx="2929928" cy="1462067"/>
+              <a:chOff x="3386153" y="46165"/>
+              <a:chExt cx="2929928" cy="1462067"/>
+            </a:xfrm>
+            <a:noFill/>
+          </p:grpSpPr>
+          <p:sp>
+            <p:nvSpPr>
+              <p:cNvPr id="19" name="Rectangle 18"/>
+              <p:cNvSpPr/>
+              <p:nvPr/>
+            </p:nvSpPr>
+            <p:spPr>
+              <a:xfrm>
+                <a:off x="3386153" y="46165"/>
+                <a:ext cx="2929928" cy="1462067"/>
+              </a:xfrm>
+              <a:prstGeom prst="rect">
+                <a:avLst/>
+              </a:prstGeom>
+              <a:grpFill/>
+              <a:ln w="50800">
+                <a:solidFill>
+                  <a:srgbClr val="0070C0"/>
+                </a:solidFill>
+              </a:ln>
+            </p:spPr>
+            <p:style>
+              <a:lnRef idx="2">
+                <a:schemeClr val="accent1">
+                  <a:shade val="50000"/>
+                </a:schemeClr>
+              </a:lnRef>
+              <a:fillRef idx="1">
+                <a:schemeClr val="accent1"/>
+              </a:fillRef>
+              <a:effectRef idx="0">
+                <a:schemeClr val="accent1"/>
+              </a:effectRef>
+              <a:fontRef idx="minor">
+                <a:schemeClr val="lt1"/>
+              </a:fontRef>
+            </p:style>
+            <p:txBody>
+              <a:bodyPr rtlCol="0" anchor="ctr"/>
+              <a:lstStyle/>
+              <a:p>
+                <a:pPr algn="ctr"/>
+                <a:endParaRPr lang="en-US"/>
+              </a:p>
+            </p:txBody>
+          </p:sp>
+          <p:sp>
+            <p:nvSpPr>
+              <p:cNvPr id="20" name="TextBox 19"/>
+              <p:cNvSpPr txBox="1"/>
+              <p:nvPr/>
+            </p:nvSpPr>
+            <p:spPr>
+              <a:xfrm>
+                <a:off x="3474855" y="177033"/>
+                <a:ext cx="2752524" cy="1200329"/>
+              </a:xfrm>
+              <a:prstGeom prst="rect">
+                <a:avLst/>
+              </a:prstGeom>
+              <a:grpFill/>
+            </p:spPr>
+            <p:txBody>
+              <a:bodyPr wrap="square" rtlCol="0">
+                <a:spAutoFit/>
+              </a:bodyPr>
+              <a:lstStyle/>
+              <a:p>
+                <a:pPr algn="ctr"/>
+                <a:r>
+                  <a:rPr lang="en-US" sz="2400" dirty="0" smtClean="0">
+                    <a:latin typeface="Arial" charset="0"/>
+                    <a:ea typeface="Arial" charset="0"/>
+                    <a:cs typeface="Arial" charset="0"/>
+                  </a:rPr>
+                  <a:t>Technical Specifications of Tesla Model S</a:t>
+                </a:r>
+                <a:endParaRPr lang="en-US" sz="2400" dirty="0">
+                  <a:latin typeface="Arial" charset="0"/>
+                  <a:ea typeface="Arial" charset="0"/>
+                  <a:cs typeface="Arial" charset="0"/>
+                </a:endParaRPr>
+              </a:p>
+            </p:txBody>
+          </p:sp>
+        </p:grpSp>
+        <p:grpSp>
+          <p:nvGrpSpPr>
+            <p:cNvPr id="28" name="Group 27"/>
+            <p:cNvGrpSpPr/>
+            <p:nvPr/>
+          </p:nvGrpSpPr>
+          <p:grpSpPr>
+            <a:xfrm>
+              <a:off x="1560812" y="2758666"/>
+              <a:ext cx="9350079" cy="3074576"/>
+              <a:chOff x="3386150" y="4137397"/>
+              <a:chExt cx="4780385" cy="3221032"/>
+            </a:xfrm>
+          </p:grpSpPr>
+          <p:sp>
+            <p:nvSpPr>
+              <p:cNvPr id="22" name="Rectangle 21"/>
+              <p:cNvSpPr/>
+              <p:nvPr/>
+            </p:nvSpPr>
+            <p:spPr>
+              <a:xfrm>
+                <a:off x="3386150" y="4137397"/>
+                <a:ext cx="4780385" cy="3221032"/>
+              </a:xfrm>
+              <a:prstGeom prst="rect">
+                <a:avLst/>
+              </a:prstGeom>
+              <a:noFill/>
+              <a:ln w="50800">
+                <a:solidFill>
+                  <a:srgbClr val="0070C0"/>
+                </a:solidFill>
+              </a:ln>
+            </p:spPr>
+            <p:style>
+              <a:lnRef idx="2">
+                <a:schemeClr val="accent1">
+                  <a:shade val="50000"/>
+                </a:schemeClr>
+              </a:lnRef>
+              <a:fillRef idx="1">
+                <a:schemeClr val="accent1"/>
+              </a:fillRef>
+              <a:effectRef idx="0">
+                <a:schemeClr val="accent1"/>
+              </a:effectRef>
+              <a:fontRef idx="minor">
+                <a:schemeClr val="lt1"/>
+              </a:fontRef>
+            </p:style>
+            <p:txBody>
+              <a:bodyPr rtlCol="0" anchor="ctr"/>
+              <a:lstStyle/>
+              <a:p>
+                <a:pPr algn="ctr"/>
+                <a:endParaRPr lang="en-US"/>
+              </a:p>
+            </p:txBody>
+          </p:sp>
+          <p:sp>
+            <p:nvSpPr>
+              <p:cNvPr id="25" name="TextBox 24"/>
+              <p:cNvSpPr txBox="1"/>
+              <p:nvPr/>
+            </p:nvSpPr>
+            <p:spPr>
+              <a:xfrm>
+                <a:off x="5129957" y="4382814"/>
+                <a:ext cx="1292773" cy="523220"/>
+              </a:xfrm>
+              <a:prstGeom prst="rect">
+                <a:avLst/>
+              </a:prstGeom>
+              <a:noFill/>
+            </p:spPr>
+            <p:txBody>
+              <a:bodyPr wrap="square" rtlCol="0">
+                <a:spAutoFit/>
+              </a:bodyPr>
+              <a:lstStyle/>
+              <a:p>
+                <a:pPr algn="ctr"/>
+                <a:r>
+                  <a:rPr lang="en-US" sz="2800" b="1" dirty="0" smtClean="0">
+                    <a:latin typeface="Arial" charset="0"/>
+                    <a:ea typeface="Arial" charset="0"/>
+                    <a:cs typeface="Arial" charset="0"/>
+                  </a:rPr>
+                  <a:t>SOC</a:t>
+                </a:r>
+                <a:endParaRPr lang="en-US" sz="2800" b="1" dirty="0">
+                  <a:latin typeface="Arial" charset="0"/>
+                  <a:ea typeface="Arial" charset="0"/>
+                  <a:cs typeface="Arial" charset="0"/>
+                </a:endParaRPr>
+              </a:p>
+            </p:txBody>
+          </p:sp>
+          <p:sp>
+            <p:nvSpPr>
+              <p:cNvPr id="26" name="TextBox 25"/>
+              <p:cNvSpPr txBox="1"/>
+              <p:nvPr/>
+            </p:nvSpPr>
+            <p:spPr>
+              <a:xfrm>
+                <a:off x="4087613" y="4906034"/>
+                <a:ext cx="3377458" cy="2418280"/>
+              </a:xfrm>
+              <a:prstGeom prst="rect">
+                <a:avLst/>
+              </a:prstGeom>
+              <a:noFill/>
+            </p:spPr>
+            <p:txBody>
+              <a:bodyPr wrap="square" rtlCol="0">
+                <a:spAutoFit/>
+              </a:bodyPr>
+              <a:lstStyle/>
+              <a:p>
+                <a:pPr marL="457200" indent="-457200">
+                  <a:buAutoNum type="arabicParenBoth"/>
+                </a:pPr>
+                <a:r>
+                  <a:rPr lang="en-US" sz="2400" dirty="0" smtClean="0">
+                    <a:latin typeface="Arial" charset="0"/>
+                    <a:ea typeface="Arial" charset="0"/>
+                    <a:cs typeface="Arial" charset="0"/>
+                  </a:rPr>
+                  <a:t>Stop: no change in SOC</a:t>
+                </a:r>
+              </a:p>
+              <a:p>
+                <a:r>
+                  <a:rPr lang="en-US" sz="2400" dirty="0" smtClean="0">
+                    <a:latin typeface="Arial" charset="0"/>
+                    <a:ea typeface="Arial" charset="0"/>
+                    <a:cs typeface="Arial" charset="0"/>
+                  </a:rPr>
+                  <a:t>(2) Driving: decrease in SOC</a:t>
+                </a:r>
+              </a:p>
+              <a:p>
+                <a:r>
+                  <a:rPr lang="en-US" sz="2400" dirty="0">
+                    <a:latin typeface="Arial" charset="0"/>
+                    <a:ea typeface="Arial" charset="0"/>
+                    <a:cs typeface="Arial" charset="0"/>
+                  </a:rPr>
+                  <a:t>	</a:t>
+                </a:r>
+                <a:r>
+                  <a:rPr lang="en-US" sz="2400" dirty="0" smtClean="0">
+                    <a:latin typeface="Arial" charset="0"/>
+                    <a:ea typeface="Arial" charset="0"/>
+                    <a:cs typeface="Arial" charset="0"/>
+                  </a:rPr>
+                  <a:t>- City mileage (if speed &lt; 60 mph)</a:t>
+                </a:r>
+              </a:p>
+              <a:p>
+                <a:r>
+                  <a:rPr lang="en-US" sz="2400" dirty="0">
+                    <a:latin typeface="Arial" charset="0"/>
+                    <a:ea typeface="Arial" charset="0"/>
+                    <a:cs typeface="Arial" charset="0"/>
+                  </a:rPr>
+                  <a:t>	</a:t>
+                </a:r>
+                <a:r>
+                  <a:rPr lang="en-US" sz="2400" dirty="0" smtClean="0">
+                    <a:latin typeface="Arial" charset="0"/>
+                    <a:ea typeface="Arial" charset="0"/>
+                    <a:cs typeface="Arial" charset="0"/>
+                  </a:rPr>
+                  <a:t>- Highway mileage if speed ≥ 60 mph)</a:t>
+                </a:r>
+              </a:p>
+              <a:p>
+                <a:r>
+                  <a:rPr lang="en-US" sz="2400" dirty="0" smtClean="0">
+                    <a:latin typeface="Arial" charset="0"/>
+                    <a:ea typeface="Arial" charset="0"/>
+                    <a:cs typeface="Arial" charset="0"/>
+                  </a:rPr>
+                  <a:t>(3) Home: charging starts upon arrival at home</a:t>
+                </a:r>
+              </a:p>
+              <a:p>
+                <a:r>
+                  <a:rPr lang="en-US" sz="2400" dirty="0" smtClean="0">
+                    <a:latin typeface="Arial" charset="0"/>
+                    <a:ea typeface="Arial" charset="0"/>
+                    <a:cs typeface="Arial" charset="0"/>
+                  </a:rPr>
+                  <a:t> </a:t>
+                </a:r>
+                <a:endParaRPr lang="en-US" sz="2400" dirty="0">
+                  <a:latin typeface="Arial" charset="0"/>
+                  <a:ea typeface="Arial" charset="0"/>
+                  <a:cs typeface="Arial" charset="0"/>
+                </a:endParaRPr>
+              </a:p>
+            </p:txBody>
+          </p:sp>
+        </p:grpSp>
+        <p:grpSp>
+          <p:nvGrpSpPr>
+            <p:cNvPr id="41" name="Group 40"/>
+            <p:cNvGrpSpPr/>
+            <p:nvPr/>
+          </p:nvGrpSpPr>
+          <p:grpSpPr>
+            <a:xfrm>
+              <a:off x="3034816" y="810405"/>
+              <a:ext cx="3268718" cy="617870"/>
+              <a:chOff x="3158144" y="810405"/>
+              <a:chExt cx="2929928" cy="617870"/>
+            </a:xfrm>
+          </p:grpSpPr>
+          <p:cxnSp>
+            <p:nvCxnSpPr>
+              <p:cNvPr id="32" name="Straight Arrow Connector 31"/>
+              <p:cNvCxnSpPr/>
+              <p:nvPr/>
+            </p:nvCxnSpPr>
+            <p:spPr>
+              <a:xfrm>
+                <a:off x="3158144" y="1135117"/>
+                <a:ext cx="0" cy="293158"/>
+              </a:xfrm>
+              <a:prstGeom prst="straightConnector1">
+                <a:avLst/>
+              </a:prstGeom>
+              <a:ln w="50800">
+                <a:solidFill>
+                  <a:srgbClr val="00B050"/>
+                </a:solidFill>
+                <a:tailEnd type="triangle"/>
+              </a:ln>
+            </p:spPr>
+            <p:style>
+              <a:lnRef idx="1">
+                <a:schemeClr val="accent1"/>
+              </a:lnRef>
+              <a:fillRef idx="0">
+                <a:schemeClr val="accent1"/>
+              </a:fillRef>
+              <a:effectRef idx="0">
+                <a:schemeClr val="accent1"/>
+              </a:effectRef>
+              <a:fontRef idx="minor">
+                <a:schemeClr val="tx1"/>
+              </a:fontRef>
+            </p:style>
+          </p:cxnSp>
+          <p:cxnSp>
+            <p:nvCxnSpPr>
+              <p:cNvPr id="36" name="Straight Arrow Connector 35"/>
+              <p:cNvCxnSpPr/>
+              <p:nvPr/>
+            </p:nvCxnSpPr>
+            <p:spPr>
+              <a:xfrm>
+                <a:off x="6088072" y="1135117"/>
+                <a:ext cx="0" cy="293158"/>
+              </a:xfrm>
+              <a:prstGeom prst="straightConnector1">
+                <a:avLst/>
+              </a:prstGeom>
+              <a:ln w="50800">
+                <a:solidFill>
+                  <a:srgbClr val="00B050"/>
+                </a:solidFill>
+                <a:tailEnd type="triangle"/>
+              </a:ln>
+            </p:spPr>
+            <p:style>
+              <a:lnRef idx="1">
+                <a:schemeClr val="accent1"/>
+              </a:lnRef>
+              <a:fillRef idx="0">
+                <a:schemeClr val="accent1"/>
+              </a:fillRef>
+              <a:effectRef idx="0">
+                <a:schemeClr val="accent1"/>
+              </a:effectRef>
+              <a:fontRef idx="minor">
+                <a:schemeClr val="tx1"/>
+              </a:fontRef>
+            </p:style>
+          </p:cxnSp>
+          <p:cxnSp>
+            <p:nvCxnSpPr>
+              <p:cNvPr id="38" name="Straight Connector 37"/>
+              <p:cNvCxnSpPr/>
+              <p:nvPr/>
+            </p:nvCxnSpPr>
+            <p:spPr>
+              <a:xfrm>
+                <a:off x="3158144" y="1135117"/>
+                <a:ext cx="2929928" cy="0"/>
+              </a:xfrm>
+              <a:prstGeom prst="line">
+                <a:avLst/>
+              </a:prstGeom>
+              <a:ln w="50800">
+                <a:solidFill>
+                  <a:srgbClr val="00B050"/>
+                </a:solidFill>
+              </a:ln>
+            </p:spPr>
+            <p:style>
+              <a:lnRef idx="1">
+                <a:schemeClr val="accent1"/>
+              </a:lnRef>
+              <a:fillRef idx="0">
+                <a:schemeClr val="accent1"/>
+              </a:fillRef>
+              <a:effectRef idx="0">
+                <a:schemeClr val="accent1"/>
+              </a:effectRef>
+              <a:fontRef idx="minor">
+                <a:schemeClr val="tx1"/>
+              </a:fontRef>
+            </p:style>
+          </p:cxnSp>
+          <p:cxnSp>
+            <p:nvCxnSpPr>
+              <p:cNvPr id="40" name="Straight Connector 39"/>
+              <p:cNvCxnSpPr>
+                <a:endCxn id="7" idx="2"/>
+              </p:cNvCxnSpPr>
+              <p:nvPr/>
+            </p:nvCxnSpPr>
+            <p:spPr>
+              <a:xfrm flipV="1">
+                <a:off x="4619297" y="810405"/>
+                <a:ext cx="3811" cy="324712"/>
+              </a:xfrm>
+              <a:prstGeom prst="line">
+                <a:avLst/>
+              </a:prstGeom>
+              <a:ln w="50800">
+                <a:solidFill>
+                  <a:srgbClr val="00B050"/>
+                </a:solidFill>
+              </a:ln>
+            </p:spPr>
+            <p:style>
+              <a:lnRef idx="1">
+                <a:schemeClr val="accent1"/>
+              </a:lnRef>
+              <a:fillRef idx="0">
+                <a:schemeClr val="accent1"/>
+              </a:fillRef>
+              <a:effectRef idx="0">
+                <a:schemeClr val="accent1"/>
+              </a:effectRef>
+              <a:fontRef idx="minor">
+                <a:schemeClr val="tx1"/>
+              </a:fontRef>
+            </p:style>
+          </p:cxnSp>
+        </p:grpSp>
+        <p:grpSp>
+          <p:nvGrpSpPr>
+            <p:cNvPr id="11" name="Group 10"/>
+            <p:cNvGrpSpPr/>
+            <p:nvPr/>
+          </p:nvGrpSpPr>
+          <p:grpSpPr>
+            <a:xfrm>
+              <a:off x="3158144" y="97885"/>
+              <a:ext cx="2929928" cy="712520"/>
+              <a:chOff x="3386153" y="46166"/>
+              <a:chExt cx="2929928" cy="712520"/>
+            </a:xfrm>
+            <a:solidFill>
+              <a:schemeClr val="accent1">
+                <a:lumMod val="20000"/>
+                <a:lumOff val="80000"/>
+              </a:schemeClr>
+            </a:solidFill>
+          </p:grpSpPr>
+          <p:sp>
+            <p:nvSpPr>
+              <p:cNvPr id="7" name="Rectangle 6"/>
+              <p:cNvSpPr/>
+              <p:nvPr/>
+            </p:nvSpPr>
+            <p:spPr>
+              <a:xfrm>
+                <a:off x="3386153" y="46166"/>
+                <a:ext cx="2929928" cy="712520"/>
+              </a:xfrm>
+              <a:prstGeom prst="rect">
+                <a:avLst/>
+              </a:prstGeom>
+              <a:grpFill/>
+              <a:ln w="50800">
+                <a:solidFill>
+                  <a:srgbClr val="0070C0"/>
+                </a:solidFill>
+              </a:ln>
+            </p:spPr>
+            <p:style>
+              <a:lnRef idx="2">
+                <a:schemeClr val="accent1">
+                  <a:shade val="50000"/>
+                </a:schemeClr>
+              </a:lnRef>
+              <a:fillRef idx="1">
+                <a:schemeClr val="accent1"/>
+              </a:fillRef>
+              <a:effectRef idx="0">
+                <a:schemeClr val="accent1"/>
+              </a:effectRef>
+              <a:fontRef idx="minor">
+                <a:schemeClr val="lt1"/>
+              </a:fontRef>
+            </p:style>
+            <p:txBody>
+              <a:bodyPr rtlCol="0" anchor="ctr"/>
+              <a:lstStyle/>
+              <a:p>
+                <a:pPr algn="ctr"/>
+                <a:endParaRPr lang="en-US"/>
+              </a:p>
+            </p:txBody>
+          </p:sp>
+          <p:sp>
+            <p:nvSpPr>
+              <p:cNvPr id="10" name="TextBox 9"/>
+              <p:cNvSpPr txBox="1"/>
+              <p:nvPr/>
+            </p:nvSpPr>
+            <p:spPr>
+              <a:xfrm>
+                <a:off x="3474855" y="171594"/>
+                <a:ext cx="2752524" cy="461665"/>
+              </a:xfrm>
+              <a:prstGeom prst="rect">
+                <a:avLst/>
+              </a:prstGeom>
+              <a:grpFill/>
+            </p:spPr>
+            <p:txBody>
+              <a:bodyPr wrap="square" rtlCol="0">
+                <a:spAutoFit/>
+              </a:bodyPr>
+              <a:lstStyle/>
+              <a:p>
+                <a:pPr algn="ctr"/>
+                <a:r>
+                  <a:rPr lang="en-US" sz="2400" dirty="0" smtClean="0">
+                    <a:latin typeface="Arial" charset="0"/>
+                    <a:ea typeface="Arial" charset="0"/>
+                    <a:cs typeface="Arial" charset="0"/>
+                  </a:rPr>
+                  <a:t>NHTS Travel Data</a:t>
+                </a:r>
+                <a:endParaRPr lang="en-US" sz="2400" dirty="0">
+                  <a:latin typeface="Arial" charset="0"/>
+                  <a:ea typeface="Arial" charset="0"/>
+                  <a:cs typeface="Arial" charset="0"/>
+                </a:endParaRPr>
+              </a:p>
+            </p:txBody>
+          </p:sp>
+        </p:grpSp>
+      </p:grpSp>
+    </p:spTree>
+    <p:extLst>
+      <p:ext uri="{BB962C8B-B14F-4D97-AF65-F5344CB8AC3E}">
+        <p14:creationId xmlns:p14="http://schemas.microsoft.com/office/powerpoint/2010/main" val="1279107257"/>
+      </p:ext>
+    </p:extLst>
+  </p:cSld>
+  <p:clrMapOvr>
+    <a:masterClrMapping/>
+  </p:clrMapOvr>
+</p:sld>
+</file>
+
+<file path=ppt/slides/slide5.xml><?xml version="1.0" encoding="utf-8"?>
+<p:sld xmlns:a="http://schemas.openxmlformats.org/drawingml/2006/main" xmlns:r="http://schemas.openxmlformats.org/officeDocument/2006/relationships" xmlns:p="http://schemas.openxmlformats.org/presentationml/2006/main">
+  <p:cSld>
+    <p:spTree>
+      <p:nvGrpSpPr>
+        <p:cNvPr id="1" name=""/>
+        <p:cNvGrpSpPr/>
+        <p:nvPr/>
+      </p:nvGrpSpPr>
+      <p:grpSpPr>
+        <a:xfrm>
+          <a:off x="0" y="0"/>
+          <a:ext cx="0" cy="0"/>
+          <a:chOff x="0" y="0"/>
+          <a:chExt cx="0" cy="0"/>
+        </a:xfrm>
+      </p:grpSpPr>
+      <p:grpSp>
+        <p:nvGrpSpPr>
+          <p:cNvPr id="36" name="Group 35"/>
+          <p:cNvGrpSpPr/>
+          <p:nvPr/>
+        </p:nvGrpSpPr>
+        <p:grpSpPr>
+          <a:xfrm>
+            <a:off x="349530" y="511646"/>
+            <a:ext cx="11763302" cy="4796624"/>
+            <a:chOff x="349530" y="511646"/>
+            <a:chExt cx="11763302" cy="4796624"/>
+          </a:xfrm>
+        </p:grpSpPr>
+        <p:cxnSp>
+          <p:nvCxnSpPr>
+            <p:cNvPr id="18" name="Straight Arrow Connector 17"/>
+            <p:cNvCxnSpPr/>
+            <p:nvPr/>
+          </p:nvCxnSpPr>
+          <p:spPr>
+            <a:xfrm>
+              <a:off x="8008026" y="2384205"/>
+              <a:ext cx="512079" cy="1"/>
+            </a:xfrm>
+            <a:prstGeom prst="straightConnector1">
+              <a:avLst/>
+            </a:prstGeom>
+            <a:ln w="50800">
+              <a:solidFill>
+                <a:srgbClr val="00B050"/>
+              </a:solidFill>
+              <a:tailEnd type="triangle"/>
+            </a:ln>
+          </p:spPr>
+          <p:style>
+            <a:lnRef idx="1">
+              <a:schemeClr val="accent1"/>
+            </a:lnRef>
+            <a:fillRef idx="0">
+              <a:schemeClr val="accent1"/>
+            </a:fillRef>
+            <a:effectRef idx="0">
+              <a:schemeClr val="accent1"/>
+            </a:effectRef>
+            <a:fontRef idx="minor">
+              <a:schemeClr val="tx1"/>
+            </a:fontRef>
+          </p:style>
+        </p:cxnSp>
+        <p:cxnSp>
+          <p:nvCxnSpPr>
+            <p:cNvPr id="23" name="Straight Connector 22"/>
+            <p:cNvCxnSpPr>
+              <a:stCxn id="11" idx="2"/>
+            </p:cNvCxnSpPr>
+            <p:nvPr/>
+          </p:nvCxnSpPr>
+          <p:spPr>
+            <a:xfrm>
+              <a:off x="10304415" y="4156365"/>
+              <a:ext cx="0" cy="798950"/>
+            </a:xfrm>
+            <a:prstGeom prst="line">
+              <a:avLst/>
+            </a:prstGeom>
+            <a:ln w="50800">
+              <a:solidFill>
+                <a:srgbClr val="00B050"/>
+              </a:solidFill>
+            </a:ln>
+          </p:spPr>
+          <p:style>
+            <a:lnRef idx="1">
+              <a:schemeClr val="accent1"/>
+            </a:lnRef>
+            <a:fillRef idx="0">
+              <a:schemeClr val="accent1"/>
+            </a:fillRef>
+            <a:effectRef idx="0">
+              <a:schemeClr val="accent1"/>
+            </a:effectRef>
+            <a:fontRef idx="minor">
+              <a:schemeClr val="tx1"/>
+            </a:fontRef>
+          </p:style>
+        </p:cxnSp>
+        <p:cxnSp>
+          <p:nvCxnSpPr>
+            <p:cNvPr id="25" name="Straight Arrow Connector 24"/>
+            <p:cNvCxnSpPr/>
+            <p:nvPr/>
+          </p:nvCxnSpPr>
+          <p:spPr>
+            <a:xfrm flipH="1">
+              <a:off x="8039598" y="4955315"/>
+              <a:ext cx="2264817" cy="0"/>
+            </a:xfrm>
+            <a:prstGeom prst="straightConnector1">
+              <a:avLst/>
+            </a:prstGeom>
+            <a:ln w="50800">
+              <a:solidFill>
+                <a:srgbClr val="00B050"/>
+              </a:solidFill>
+              <a:tailEnd type="triangle"/>
+            </a:ln>
+          </p:spPr>
+          <p:style>
+            <a:lnRef idx="1">
+              <a:schemeClr val="accent1"/>
+            </a:lnRef>
+            <a:fillRef idx="0">
+              <a:schemeClr val="accent1"/>
+            </a:fillRef>
+            <a:effectRef idx="0">
+              <a:schemeClr val="accent1"/>
+            </a:effectRef>
+            <a:fontRef idx="minor">
+              <a:schemeClr val="tx1"/>
+            </a:fontRef>
+          </p:style>
+        </p:cxnSp>
+        <p:cxnSp>
+          <p:nvCxnSpPr>
+            <p:cNvPr id="29" name="Straight Arrow Connector 28"/>
+            <p:cNvCxnSpPr>
+              <a:endCxn id="4" idx="2"/>
+            </p:cNvCxnSpPr>
+            <p:nvPr/>
+          </p:nvCxnSpPr>
+          <p:spPr>
+            <a:xfrm flipV="1">
+              <a:off x="2122318" y="4156364"/>
+              <a:ext cx="0" cy="798951"/>
+            </a:xfrm>
+            <a:prstGeom prst="straightConnector1">
+              <a:avLst/>
+            </a:prstGeom>
+            <a:ln w="50800">
+              <a:solidFill>
+                <a:srgbClr val="00B050"/>
+              </a:solidFill>
+              <a:tailEnd type="triangle"/>
+            </a:ln>
+          </p:spPr>
+          <p:style>
+            <a:lnRef idx="1">
+              <a:schemeClr val="accent1"/>
+            </a:lnRef>
+            <a:fillRef idx="0">
+              <a:schemeClr val="accent1"/>
+            </a:fillRef>
+            <a:effectRef idx="0">
+              <a:schemeClr val="accent1"/>
+            </a:effectRef>
+            <a:fontRef idx="minor">
+              <a:schemeClr val="tx1"/>
+            </a:fontRef>
+          </p:style>
+        </p:cxnSp>
+        <p:cxnSp>
+          <p:nvCxnSpPr>
+            <p:cNvPr id="34" name="Straight Connector 33"/>
+            <p:cNvCxnSpPr>
+              <a:stCxn id="14" idx="1"/>
+            </p:cNvCxnSpPr>
+            <p:nvPr/>
+          </p:nvCxnSpPr>
+          <p:spPr>
+            <a:xfrm flipH="1" flipV="1">
+              <a:off x="2122318" y="4955315"/>
+              <a:ext cx="2336075" cy="1"/>
+            </a:xfrm>
+            <a:prstGeom prst="line">
+              <a:avLst/>
+            </a:prstGeom>
+            <a:ln w="50800">
+              <a:solidFill>
+                <a:srgbClr val="00B050"/>
+              </a:solidFill>
+            </a:ln>
+          </p:spPr>
+          <p:style>
+            <a:lnRef idx="1">
+              <a:schemeClr val="accent1"/>
+            </a:lnRef>
+            <a:fillRef idx="0">
+              <a:schemeClr val="accent1"/>
+            </a:fillRef>
+            <a:effectRef idx="0">
+              <a:schemeClr val="accent1"/>
+            </a:effectRef>
+            <a:fontRef idx="minor">
+              <a:schemeClr val="tx1"/>
+            </a:fontRef>
+          </p:style>
+        </p:cxnSp>
+        <p:cxnSp>
+          <p:nvCxnSpPr>
+            <p:cNvPr id="17" name="Straight Arrow Connector 16"/>
+            <p:cNvCxnSpPr>
+              <a:stCxn id="4" idx="3"/>
+              <a:endCxn id="8" idx="1"/>
+            </p:cNvCxnSpPr>
+            <p:nvPr/>
+          </p:nvCxnSpPr>
+          <p:spPr>
+            <a:xfrm>
+              <a:off x="3895106" y="2384205"/>
+              <a:ext cx="563287" cy="1"/>
+            </a:xfrm>
+            <a:prstGeom prst="straightConnector1">
+              <a:avLst/>
+            </a:prstGeom>
+            <a:ln w="50800">
+              <a:solidFill>
+                <a:srgbClr val="00B050"/>
+              </a:solidFill>
+              <a:tailEnd type="triangle"/>
+            </a:ln>
+          </p:spPr>
+          <p:style>
+            <a:lnRef idx="1">
+              <a:schemeClr val="accent1"/>
+            </a:lnRef>
+            <a:fillRef idx="0">
+              <a:schemeClr val="accent1"/>
+            </a:fillRef>
+            <a:effectRef idx="0">
+              <a:schemeClr val="accent1"/>
+            </a:effectRef>
+            <a:fontRef idx="minor">
+              <a:schemeClr val="tx1"/>
+            </a:fontRef>
+          </p:style>
+        </p:cxnSp>
+        <p:grpSp>
+          <p:nvGrpSpPr>
+            <p:cNvPr id="6" name="Group 5"/>
+            <p:cNvGrpSpPr/>
+            <p:nvPr/>
+          </p:nvGrpSpPr>
+          <p:grpSpPr>
+            <a:xfrm>
+              <a:off x="349530" y="511646"/>
+              <a:ext cx="3581205" cy="3644718"/>
+              <a:chOff x="895795" y="511646"/>
+              <a:chExt cx="3581205" cy="4404737"/>
+            </a:xfrm>
+          </p:grpSpPr>
+          <p:sp>
+            <p:nvSpPr>
+              <p:cNvPr id="4" name="Rectangle 3"/>
+              <p:cNvSpPr/>
+              <p:nvPr/>
+            </p:nvSpPr>
+            <p:spPr>
+              <a:xfrm>
+                <a:off x="895795" y="632982"/>
+                <a:ext cx="3545576" cy="4283401"/>
+              </a:xfrm>
+              <a:prstGeom prst="rect">
+                <a:avLst/>
+              </a:prstGeom>
+              <a:noFill/>
+              <a:ln w="50800">
+                <a:solidFill>
+                  <a:srgbClr val="0070C0"/>
+                </a:solidFill>
+              </a:ln>
+            </p:spPr>
+            <p:style>
+              <a:lnRef idx="2">
+                <a:schemeClr val="accent1">
+                  <a:shade val="50000"/>
+                </a:schemeClr>
+              </a:lnRef>
+              <a:fillRef idx="1">
+                <a:schemeClr val="accent1"/>
+              </a:fillRef>
+              <a:effectRef idx="0">
+                <a:schemeClr val="accent1"/>
+              </a:effectRef>
+              <a:fontRef idx="minor">
+                <a:schemeClr val="lt1"/>
+              </a:fontRef>
+            </p:style>
+            <p:txBody>
+              <a:bodyPr rtlCol="0" anchor="ctr"/>
+              <a:lstStyle/>
+              <a:p>
+                <a:pPr algn="ctr"/>
+                <a:endParaRPr lang="en-US"/>
+              </a:p>
+            </p:txBody>
+          </p:sp>
+          <p:sp>
+            <p:nvSpPr>
+              <p:cNvPr id="5" name="TextBox 4"/>
+              <p:cNvSpPr txBox="1"/>
+              <p:nvPr/>
+            </p:nvSpPr>
+            <p:spPr>
+              <a:xfrm>
+                <a:off x="899162" y="511646"/>
+                <a:ext cx="3577838" cy="3459191"/>
+              </a:xfrm>
+              <a:prstGeom prst="rect">
+                <a:avLst/>
+              </a:prstGeom>
+              <a:noFill/>
+            </p:spPr>
+            <p:txBody>
+              <a:bodyPr wrap="square" rtlCol="0">
+                <a:spAutoFit/>
+              </a:bodyPr>
+              <a:lstStyle/>
+              <a:p>
+                <a:pPr algn="ctr">
+                  <a:lnSpc>
+                    <a:spcPct val="200000"/>
+                  </a:lnSpc>
+                </a:pPr>
+                <a:r>
+                  <a:rPr lang="en-US" sz="2400" b="1" dirty="0" smtClean="0">
+                    <a:latin typeface="Arial" charset="0"/>
+                    <a:ea typeface="Arial" charset="0"/>
+                    <a:cs typeface="Arial" charset="0"/>
+                  </a:rPr>
+                  <a:t>Modeling</a:t>
+                </a:r>
+              </a:p>
+              <a:p>
+                <a:pPr>
+                  <a:lnSpc>
+                    <a:spcPct val="150000"/>
+                  </a:lnSpc>
+                </a:pPr>
+                <a:r>
+                  <a:rPr lang="en-US" sz="2400" dirty="0" smtClean="0">
+                    <a:latin typeface="Arial" charset="0"/>
+                    <a:ea typeface="Arial" charset="0"/>
+                    <a:cs typeface="Arial" charset="0"/>
+                  </a:rPr>
+                  <a:t>- Driving Profiles</a:t>
+                </a:r>
+                <a:endParaRPr lang="en-US" sz="2400" dirty="0">
+                  <a:latin typeface="Arial" charset="0"/>
+                  <a:ea typeface="Arial" charset="0"/>
+                  <a:cs typeface="Arial" charset="0"/>
+                </a:endParaRPr>
+              </a:p>
+              <a:p>
+                <a:pPr>
+                  <a:lnSpc>
+                    <a:spcPct val="150000"/>
+                  </a:lnSpc>
+                </a:pPr>
+                <a:r>
+                  <a:rPr lang="en-US" sz="2400" dirty="0" smtClean="0">
+                    <a:latin typeface="Arial" charset="0"/>
+                    <a:ea typeface="Arial" charset="0"/>
+                    <a:cs typeface="Arial" charset="0"/>
+                  </a:rPr>
+                  <a:t>- Vehicle Specifications</a:t>
+                </a:r>
+              </a:p>
+              <a:p>
+                <a:pPr>
+                  <a:lnSpc>
+                    <a:spcPct val="150000"/>
+                  </a:lnSpc>
+                </a:pPr>
+                <a:r>
+                  <a:rPr lang="en-US" sz="2400" dirty="0" smtClean="0">
+                    <a:latin typeface="Arial" charset="0"/>
+                    <a:ea typeface="Arial" charset="0"/>
+                    <a:cs typeface="Arial" charset="0"/>
+                  </a:rPr>
+                  <a:t>- SOC</a:t>
+                </a:r>
+                <a:endParaRPr lang="en-US" sz="2400" dirty="0">
+                  <a:latin typeface="Arial" charset="0"/>
+                  <a:ea typeface="Arial" charset="0"/>
+                  <a:cs typeface="Arial" charset="0"/>
+                </a:endParaRPr>
+              </a:p>
+              <a:p>
+                <a:endParaRPr lang="en-US" sz="2400" dirty="0" smtClean="0">
+                  <a:latin typeface="Arial" charset="0"/>
+                  <a:ea typeface="Arial" charset="0"/>
+                  <a:cs typeface="Arial" charset="0"/>
+                </a:endParaRPr>
+              </a:p>
+            </p:txBody>
+          </p:sp>
+        </p:grpSp>
+        <p:grpSp>
+          <p:nvGrpSpPr>
+            <p:cNvPr id="7" name="Group 6"/>
+            <p:cNvGrpSpPr/>
+            <p:nvPr/>
+          </p:nvGrpSpPr>
+          <p:grpSpPr>
+            <a:xfrm>
+              <a:off x="4458393" y="511647"/>
+              <a:ext cx="3581205" cy="3970318"/>
+              <a:chOff x="895795" y="511646"/>
+              <a:chExt cx="3581205" cy="4798233"/>
+            </a:xfrm>
+          </p:grpSpPr>
+          <p:sp>
+            <p:nvSpPr>
+              <p:cNvPr id="8" name="Rectangle 7"/>
+              <p:cNvSpPr/>
+              <p:nvPr/>
+            </p:nvSpPr>
+            <p:spPr>
+              <a:xfrm>
+                <a:off x="895795" y="632982"/>
+                <a:ext cx="3545576" cy="4283401"/>
+              </a:xfrm>
+              <a:prstGeom prst="rect">
+                <a:avLst/>
+              </a:prstGeom>
+              <a:noFill/>
+              <a:ln w="50800">
+                <a:solidFill>
+                  <a:srgbClr val="0070C0"/>
+                </a:solidFill>
+              </a:ln>
+            </p:spPr>
+            <p:style>
+              <a:lnRef idx="2">
+                <a:schemeClr val="accent1">
+                  <a:shade val="50000"/>
+                </a:schemeClr>
+              </a:lnRef>
+              <a:fillRef idx="1">
+                <a:schemeClr val="accent1"/>
+              </a:fillRef>
+              <a:effectRef idx="0">
+                <a:schemeClr val="accent1"/>
+              </a:effectRef>
+              <a:fontRef idx="minor">
+                <a:schemeClr val="lt1"/>
+              </a:fontRef>
+            </p:style>
+            <p:txBody>
+              <a:bodyPr rtlCol="0" anchor="ctr"/>
+              <a:lstStyle/>
+              <a:p>
+                <a:pPr algn="ctr"/>
+                <a:endParaRPr lang="en-US"/>
+              </a:p>
+            </p:txBody>
+          </p:sp>
+          <p:sp>
+            <p:nvSpPr>
+              <p:cNvPr id="9" name="TextBox 8"/>
+              <p:cNvSpPr txBox="1"/>
+              <p:nvPr/>
+            </p:nvSpPr>
+            <p:spPr>
+              <a:xfrm>
+                <a:off x="899162" y="511646"/>
+                <a:ext cx="3577838" cy="4798233"/>
+              </a:xfrm>
+              <a:prstGeom prst="rect">
+                <a:avLst/>
+              </a:prstGeom>
+              <a:noFill/>
+            </p:spPr>
+            <p:txBody>
+              <a:bodyPr wrap="square" rtlCol="0">
+                <a:spAutoFit/>
+              </a:bodyPr>
+              <a:lstStyle/>
+              <a:p>
+                <a:pPr algn="ctr">
+                  <a:lnSpc>
+                    <a:spcPct val="200000"/>
+                  </a:lnSpc>
+                </a:pPr>
+                <a:r>
+                  <a:rPr lang="en-US" sz="2400" b="1" dirty="0" smtClean="0">
+                    <a:latin typeface="Arial" charset="0"/>
+                    <a:ea typeface="Arial" charset="0"/>
+                    <a:cs typeface="Arial" charset="0"/>
+                  </a:rPr>
+                  <a:t>Simulation</a:t>
+                </a:r>
+              </a:p>
+              <a:p>
+                <a:pPr>
+                  <a:lnSpc>
+                    <a:spcPct val="150000"/>
+                  </a:lnSpc>
+                </a:pPr>
+                <a:r>
+                  <a:rPr lang="en-US" sz="2400" dirty="0" smtClean="0">
+                    <a:latin typeface="Arial" charset="0"/>
+                    <a:ea typeface="Arial" charset="0"/>
+                    <a:cs typeface="Arial" charset="0"/>
+                  </a:rPr>
+                  <a:t>- Alternative Plans</a:t>
+                </a:r>
+              </a:p>
+              <a:p>
+                <a:pPr>
+                  <a:lnSpc>
+                    <a:spcPct val="150000"/>
+                  </a:lnSpc>
+                </a:pPr>
+                <a:r>
+                  <a:rPr lang="en-US" sz="2400" dirty="0" smtClean="0">
+                    <a:latin typeface="Arial" charset="0"/>
+                    <a:ea typeface="Arial" charset="0"/>
+                    <a:cs typeface="Arial" charset="0"/>
+                  </a:rPr>
+                  <a:t>- Schemes</a:t>
+                </a:r>
+              </a:p>
+              <a:p>
+                <a:pPr>
+                  <a:lnSpc>
+                    <a:spcPct val="150000"/>
+                  </a:lnSpc>
+                </a:pPr>
+                <a:r>
+                  <a:rPr lang="en-US" sz="2400" dirty="0">
+                    <a:latin typeface="Arial" charset="0"/>
+                    <a:ea typeface="Arial" charset="0"/>
+                    <a:cs typeface="Arial" charset="0"/>
+                  </a:rPr>
+                  <a:t>- Electricity Consumption</a:t>
+                </a:r>
+              </a:p>
+              <a:p>
+                <a:pPr>
+                  <a:lnSpc>
+                    <a:spcPct val="150000"/>
+                  </a:lnSpc>
+                </a:pPr>
+                <a:r>
+                  <a:rPr lang="en-US" sz="2400" dirty="0">
+                    <a:latin typeface="Arial" charset="0"/>
+                    <a:ea typeface="Arial" charset="0"/>
+                    <a:cs typeface="Arial" charset="0"/>
+                  </a:rPr>
+                  <a:t>- Total Cost</a:t>
+                </a:r>
+              </a:p>
+              <a:p>
+                <a:pPr>
+                  <a:lnSpc>
+                    <a:spcPct val="150000"/>
+                  </a:lnSpc>
+                </a:pPr>
+                <a:endParaRPr lang="en-US" sz="2400" dirty="0">
+                  <a:latin typeface="Arial" charset="0"/>
+                  <a:ea typeface="Arial" charset="0"/>
+                  <a:cs typeface="Arial" charset="0"/>
+                </a:endParaRPr>
+              </a:p>
+              <a:p>
+                <a:endParaRPr lang="en-US" sz="2400" dirty="0" smtClean="0">
+                  <a:latin typeface="Arial" charset="0"/>
+                  <a:ea typeface="Arial" charset="0"/>
+                  <a:cs typeface="Arial" charset="0"/>
+                </a:endParaRPr>
+              </a:p>
+            </p:txBody>
+          </p:sp>
+        </p:grpSp>
+        <p:grpSp>
+          <p:nvGrpSpPr>
+            <p:cNvPr id="10" name="Group 9"/>
+            <p:cNvGrpSpPr/>
+            <p:nvPr/>
+          </p:nvGrpSpPr>
+          <p:grpSpPr>
+            <a:xfrm>
+              <a:off x="8531627" y="511647"/>
+              <a:ext cx="3581205" cy="3644718"/>
+              <a:chOff x="895795" y="511646"/>
+              <a:chExt cx="3581205" cy="4404737"/>
+            </a:xfrm>
+          </p:grpSpPr>
+          <p:sp>
+            <p:nvSpPr>
+              <p:cNvPr id="11" name="Rectangle 10"/>
+              <p:cNvSpPr/>
+              <p:nvPr/>
+            </p:nvSpPr>
+            <p:spPr>
+              <a:xfrm>
+                <a:off x="895795" y="632982"/>
+                <a:ext cx="3545576" cy="4283401"/>
+              </a:xfrm>
+              <a:prstGeom prst="rect">
+                <a:avLst/>
+              </a:prstGeom>
+              <a:noFill/>
+              <a:ln w="50800">
+                <a:solidFill>
+                  <a:srgbClr val="0070C0"/>
+                </a:solidFill>
+              </a:ln>
+            </p:spPr>
+            <p:style>
+              <a:lnRef idx="2">
+                <a:schemeClr val="accent1">
+                  <a:shade val="50000"/>
+                </a:schemeClr>
+              </a:lnRef>
+              <a:fillRef idx="1">
+                <a:schemeClr val="accent1"/>
+              </a:fillRef>
+              <a:effectRef idx="0">
+                <a:schemeClr val="accent1"/>
+              </a:effectRef>
+              <a:fontRef idx="minor">
+                <a:schemeClr val="lt1"/>
+              </a:fontRef>
+            </p:style>
+            <p:txBody>
+              <a:bodyPr rtlCol="0" anchor="ctr"/>
+              <a:lstStyle/>
+              <a:p>
+                <a:pPr algn="ctr"/>
+                <a:endParaRPr lang="en-US"/>
+              </a:p>
+            </p:txBody>
+          </p:sp>
+          <p:sp>
+            <p:nvSpPr>
+              <p:cNvPr id="12" name="TextBox 11"/>
+              <p:cNvSpPr txBox="1"/>
+              <p:nvPr/>
+            </p:nvSpPr>
+            <p:spPr>
+              <a:xfrm>
+                <a:off x="899162" y="511646"/>
+                <a:ext cx="3577838" cy="3046988"/>
+              </a:xfrm>
+              <a:prstGeom prst="rect">
+                <a:avLst/>
+              </a:prstGeom>
+              <a:noFill/>
+            </p:spPr>
+            <p:txBody>
+              <a:bodyPr wrap="square" rtlCol="0">
+                <a:spAutoFit/>
+              </a:bodyPr>
+              <a:lstStyle/>
+              <a:p>
+                <a:pPr algn="ctr">
+                  <a:lnSpc>
+                    <a:spcPct val="200000"/>
+                  </a:lnSpc>
+                </a:pPr>
+                <a:r>
+                  <a:rPr lang="en-US" sz="2400" b="1" dirty="0" smtClean="0">
+                    <a:latin typeface="Arial" charset="0"/>
+                    <a:ea typeface="Arial" charset="0"/>
+                    <a:cs typeface="Arial" charset="0"/>
+                  </a:rPr>
+                  <a:t>Optimization</a:t>
+                </a:r>
+              </a:p>
+              <a:p>
+                <a:pPr>
+                  <a:lnSpc>
+                    <a:spcPct val="150000"/>
+                  </a:lnSpc>
+                </a:pPr>
+                <a:r>
+                  <a:rPr lang="en-US" sz="2400" dirty="0" smtClean="0">
+                    <a:latin typeface="Arial" charset="0"/>
+                    <a:ea typeface="Arial" charset="0"/>
+                    <a:cs typeface="Arial" charset="0"/>
+                  </a:rPr>
+                  <a:t>- EPOS</a:t>
+                </a:r>
+                <a:endParaRPr lang="en-US" sz="2400" dirty="0">
+                  <a:latin typeface="Arial" charset="0"/>
+                  <a:ea typeface="Arial" charset="0"/>
+                  <a:cs typeface="Arial" charset="0"/>
+                </a:endParaRPr>
+              </a:p>
+              <a:p>
+                <a:pPr>
+                  <a:lnSpc>
+                    <a:spcPct val="150000"/>
+                  </a:lnSpc>
+                </a:pPr>
+                <a:r>
+                  <a:rPr lang="en-US" sz="2400" dirty="0" smtClean="0">
+                    <a:latin typeface="Arial" charset="0"/>
+                    <a:ea typeface="Arial" charset="0"/>
+                    <a:cs typeface="Arial" charset="0"/>
+                  </a:rPr>
+                  <a:t>- Objective Function</a:t>
+                </a:r>
+              </a:p>
+              <a:p>
+                <a:pPr>
+                  <a:lnSpc>
+                    <a:spcPct val="150000"/>
+                  </a:lnSpc>
+                </a:pPr>
+                <a:r>
+                  <a:rPr lang="en-US" sz="2400" dirty="0">
+                    <a:latin typeface="Arial" charset="0"/>
+                    <a:ea typeface="Arial" charset="0"/>
+                    <a:cs typeface="Arial" charset="0"/>
+                  </a:rPr>
+                  <a:t> </a:t>
+                </a:r>
+                <a:r>
+                  <a:rPr lang="en-US" sz="2400" dirty="0" smtClean="0">
+                    <a:latin typeface="Arial" charset="0"/>
+                    <a:ea typeface="Arial" charset="0"/>
+                    <a:cs typeface="Arial" charset="0"/>
+                  </a:rPr>
+                  <a:t>  (1) Minimize </a:t>
+                </a:r>
+                <a:r>
+                  <a:rPr lang="el-GR" sz="2400" dirty="0" smtClean="0">
+                    <a:latin typeface="Arial" charset="0"/>
+                    <a:ea typeface="Arial" charset="0"/>
+                    <a:cs typeface="Arial" charset="0"/>
+                  </a:rPr>
+                  <a:t>σ</a:t>
+                </a:r>
+                <a:endParaRPr lang="en-US" sz="2400" dirty="0" smtClean="0">
+                  <a:latin typeface="Arial" charset="0"/>
+                  <a:ea typeface="Arial" charset="0"/>
+                  <a:cs typeface="Arial" charset="0"/>
+                </a:endParaRPr>
+              </a:p>
+              <a:p>
+                <a:pPr>
+                  <a:lnSpc>
+                    <a:spcPct val="150000"/>
+                  </a:lnSpc>
+                </a:pPr>
+                <a:r>
+                  <a:rPr lang="en-US" sz="2400" dirty="0" smtClean="0">
+                    <a:latin typeface="Arial" charset="0"/>
+                    <a:ea typeface="Arial" charset="0"/>
+                    <a:cs typeface="Arial" charset="0"/>
+                  </a:rPr>
+                  <a:t>   (2) Minimize Cost</a:t>
+                </a:r>
+              </a:p>
+            </p:txBody>
+          </p:sp>
+        </p:grpSp>
+        <p:grpSp>
+          <p:nvGrpSpPr>
+            <p:cNvPr id="13" name="Group 12"/>
+            <p:cNvGrpSpPr/>
+            <p:nvPr/>
+          </p:nvGrpSpPr>
+          <p:grpSpPr>
+            <a:xfrm>
+              <a:off x="4458393" y="4602361"/>
+              <a:ext cx="3581205" cy="705909"/>
+              <a:chOff x="895795" y="632982"/>
+              <a:chExt cx="3581205" cy="4283401"/>
+            </a:xfrm>
+          </p:grpSpPr>
+          <p:sp>
+            <p:nvSpPr>
+              <p:cNvPr id="14" name="Rectangle 13"/>
+              <p:cNvSpPr/>
+              <p:nvPr/>
+            </p:nvSpPr>
+            <p:spPr>
+              <a:xfrm>
+                <a:off x="895795" y="632982"/>
+                <a:ext cx="3545576" cy="4283401"/>
+              </a:xfrm>
+              <a:prstGeom prst="rect">
+                <a:avLst/>
+              </a:prstGeom>
+              <a:noFill/>
+              <a:ln w="50800">
+                <a:solidFill>
+                  <a:srgbClr val="0070C0"/>
+                </a:solidFill>
+              </a:ln>
+            </p:spPr>
+            <p:style>
+              <a:lnRef idx="2">
+                <a:schemeClr val="accent1">
+                  <a:shade val="50000"/>
+                </a:schemeClr>
+              </a:lnRef>
+              <a:fillRef idx="1">
+                <a:schemeClr val="accent1"/>
+              </a:fillRef>
+              <a:effectRef idx="0">
+                <a:schemeClr val="accent1"/>
+              </a:effectRef>
+              <a:fontRef idx="minor">
+                <a:schemeClr val="lt1"/>
+              </a:fontRef>
+            </p:style>
+            <p:txBody>
+              <a:bodyPr rtlCol="0" anchor="ctr"/>
+              <a:lstStyle/>
+              <a:p>
+                <a:pPr algn="ctr"/>
+                <a:endParaRPr lang="en-US"/>
+              </a:p>
+            </p:txBody>
+          </p:sp>
+          <p:sp>
+            <p:nvSpPr>
+              <p:cNvPr id="15" name="TextBox 14"/>
+              <p:cNvSpPr txBox="1"/>
+              <p:nvPr/>
+            </p:nvSpPr>
+            <p:spPr>
+              <a:xfrm>
+                <a:off x="899162" y="727818"/>
+                <a:ext cx="3577838" cy="2654771"/>
+              </a:xfrm>
+              <a:prstGeom prst="rect">
+                <a:avLst/>
+              </a:prstGeom>
+              <a:noFill/>
+            </p:spPr>
+            <p:txBody>
+              <a:bodyPr wrap="square" rtlCol="0">
+                <a:spAutoFit/>
+              </a:bodyPr>
+              <a:lstStyle/>
+              <a:p>
+                <a:pPr algn="ctr">
+                  <a:lnSpc>
+                    <a:spcPct val="150000"/>
+                  </a:lnSpc>
+                </a:pPr>
+                <a:r>
+                  <a:rPr lang="en-US" sz="2400" b="1" dirty="0" smtClean="0">
+                    <a:latin typeface="Arial" charset="0"/>
+                    <a:ea typeface="Arial" charset="0"/>
+                    <a:cs typeface="Arial" charset="0"/>
+                  </a:rPr>
+                  <a:t>Feedback</a:t>
+                </a:r>
+                <a:endParaRPr lang="en-US" sz="2400" b="1" dirty="0">
+                  <a:latin typeface="Arial" charset="0"/>
+                  <a:ea typeface="Arial" charset="0"/>
+                  <a:cs typeface="Arial" charset="0"/>
+                </a:endParaRPr>
+              </a:p>
+              <a:p>
+                <a:pPr algn="ctr"/>
+                <a:endParaRPr lang="en-US" sz="2400" dirty="0" smtClean="0">
+                  <a:latin typeface="Arial" charset="0"/>
+                  <a:ea typeface="Arial" charset="0"/>
+                  <a:cs typeface="Arial" charset="0"/>
+                </a:endParaRPr>
+              </a:p>
+            </p:txBody>
+          </p:sp>
+        </p:grpSp>
+      </p:grpSp>
+    </p:spTree>
+    <p:extLst>
+      <p:ext uri="{BB962C8B-B14F-4D97-AF65-F5344CB8AC3E}">
+        <p14:creationId xmlns:p14="http://schemas.microsoft.com/office/powerpoint/2010/main" val="359255442"/>
+      </p:ext>
+    </p:extLst>
+  </p:cSld>
+  <p:clrMapOvr>
+    <a:masterClrMapping/>
+  </p:clrMapOvr>
+</p:sld>
+</file>
+
+<file path=ppt/slides/slide6.xml><?xml version="1.0" encoding="utf-8"?>
+<p:sld xmlns:a="http://schemas.openxmlformats.org/drawingml/2006/main" xmlns:r="http://schemas.openxmlformats.org/officeDocument/2006/relationships" xmlns:p="http://schemas.openxmlformats.org/presentationml/2006/main">
+  <p:cSld>
+    <p:spTree>
+      <p:nvGrpSpPr>
+        <p:cNvPr id="1" name=""/>
+        <p:cNvGrpSpPr/>
+        <p:nvPr/>
+      </p:nvGrpSpPr>
+      <p:grpSpPr>
+        <a:xfrm>
+          <a:off x="0" y="0"/>
+          <a:ext cx="0" cy="0"/>
+          <a:chOff x="0" y="0"/>
+          <a:chExt cx="0" cy="0"/>
+        </a:xfrm>
+      </p:grpSpPr>
+      <p:grpSp>
+        <p:nvGrpSpPr>
+          <p:cNvPr id="4" name="Group 3"/>
+          <p:cNvGrpSpPr/>
+          <p:nvPr/>
+        </p:nvGrpSpPr>
+        <p:grpSpPr>
+          <a:xfrm>
+            <a:off x="1965208" y="148859"/>
+            <a:ext cx="6815009" cy="4595725"/>
+            <a:chOff x="1965208" y="148859"/>
+            <a:chExt cx="6815009" cy="4595725"/>
+          </a:xfrm>
+        </p:grpSpPr>
+        <p:grpSp>
+          <p:nvGrpSpPr>
+            <p:cNvPr id="42" name="Group 41"/>
+            <p:cNvGrpSpPr/>
+            <p:nvPr/>
+          </p:nvGrpSpPr>
+          <p:grpSpPr>
+            <a:xfrm>
+              <a:off x="2053474" y="701064"/>
+              <a:ext cx="6726743" cy="3862176"/>
+              <a:chOff x="2053474" y="701064"/>
+              <a:chExt cx="6726743" cy="3862176"/>
+            </a:xfrm>
+          </p:grpSpPr>
+          <p:pic>
+            <p:nvPicPr>
+              <p:cNvPr id="5" name="그림 31"/>
+              <p:cNvPicPr>
+                <a:picLocks noChangeAspect="1"/>
+              </p:cNvPicPr>
+              <p:nvPr/>
+            </p:nvPicPr>
+            <p:blipFill>
+              <a:blip r:embed="rId2" cstate="print">
+                <a:extLst>
+                  <a:ext uri="{28A0092B-C50C-407E-A947-70E740481C1C}">
+                    <a14:useLocalDpi xmlns:a14="http://schemas.microsoft.com/office/drawing/2010/main" val="0"/>
+                  </a:ext>
+                </a:extLst>
+              </a:blip>
+              <a:stretch>
+                <a:fillRect/>
+              </a:stretch>
+            </p:blipFill>
+            <p:spPr>
+              <a:xfrm>
+                <a:off x="2053474" y="1795062"/>
+                <a:ext cx="1055062" cy="1674178"/>
+              </a:xfrm>
+              <a:prstGeom prst="rect">
+                <a:avLst/>
+              </a:prstGeom>
+            </p:spPr>
+          </p:pic>
+          <p:pic>
+            <p:nvPicPr>
+              <p:cNvPr id="9" name="그림 26"/>
+              <p:cNvPicPr>
+                <a:picLocks noChangeAspect="1"/>
+              </p:cNvPicPr>
+              <p:nvPr/>
+            </p:nvPicPr>
+            <p:blipFill>
+              <a:blip r:embed="rId3">
+                <a:extLst>
+                  <a:ext uri="{28A0092B-C50C-407E-A947-70E740481C1C}">
+                    <a14:useLocalDpi xmlns:a14="http://schemas.microsoft.com/office/drawing/2010/main" val="0"/>
+                  </a:ext>
+                </a:extLst>
+              </a:blip>
+              <a:stretch>
+                <a:fillRect/>
+              </a:stretch>
+            </p:blipFill>
+            <p:spPr>
+              <a:xfrm>
+                <a:off x="6786215" y="2130476"/>
+                <a:ext cx="1994002" cy="1003352"/>
+              </a:xfrm>
+              <a:prstGeom prst="rect">
+                <a:avLst/>
+              </a:prstGeom>
+            </p:spPr>
+          </p:pic>
+          <p:pic>
+            <p:nvPicPr>
+              <p:cNvPr id="11" name="그림 27"/>
+              <p:cNvPicPr>
+                <a:picLocks noChangeAspect="1"/>
+              </p:cNvPicPr>
+              <p:nvPr/>
+            </p:nvPicPr>
+            <p:blipFill>
+              <a:blip r:embed="rId3">
+                <a:extLst>
+                  <a:ext uri="{28A0092B-C50C-407E-A947-70E740481C1C}">
+                    <a14:useLocalDpi xmlns:a14="http://schemas.microsoft.com/office/drawing/2010/main" val="0"/>
+                  </a:ext>
+                </a:extLst>
+              </a:blip>
+              <a:stretch>
+                <a:fillRect/>
+              </a:stretch>
+            </p:blipFill>
+            <p:spPr>
+              <a:xfrm>
+                <a:off x="5721125" y="3559888"/>
+                <a:ext cx="1994002" cy="1003352"/>
+              </a:xfrm>
+              <a:prstGeom prst="rect">
+                <a:avLst/>
+              </a:prstGeom>
+            </p:spPr>
+          </p:pic>
+          <p:pic>
+            <p:nvPicPr>
+              <p:cNvPr id="12" name="그림 25"/>
+              <p:cNvPicPr>
+                <a:picLocks noChangeAspect="1"/>
+              </p:cNvPicPr>
+              <p:nvPr/>
+            </p:nvPicPr>
+            <p:blipFill>
+              <a:blip r:embed="rId3">
+                <a:extLst>
+                  <a:ext uri="{28A0092B-C50C-407E-A947-70E740481C1C}">
+                    <a14:useLocalDpi xmlns:a14="http://schemas.microsoft.com/office/drawing/2010/main" val="0"/>
+                  </a:ext>
+                </a:extLst>
+              </a:blip>
+              <a:stretch>
+                <a:fillRect/>
+              </a:stretch>
+            </p:blipFill>
+            <p:spPr>
+              <a:xfrm>
+                <a:off x="5721125" y="701064"/>
+                <a:ext cx="1994002" cy="1003352"/>
+              </a:xfrm>
+              <a:prstGeom prst="rect">
+                <a:avLst/>
+              </a:prstGeom>
+            </p:spPr>
+          </p:pic>
+          <p:cxnSp>
+            <p:nvCxnSpPr>
+              <p:cNvPr id="13" name="직선 연결선 11"/>
+              <p:cNvCxnSpPr/>
+              <p:nvPr/>
+            </p:nvCxnSpPr>
+            <p:spPr>
+              <a:xfrm>
+                <a:off x="2748496" y="2632152"/>
+                <a:ext cx="811857" cy="0"/>
+              </a:xfrm>
+              <a:prstGeom prst="line">
+                <a:avLst/>
+              </a:prstGeom>
+              <a:ln w="25400">
+                <a:solidFill>
+                  <a:schemeClr val="tx1"/>
+                </a:solidFill>
+                <a:prstDash val="solid"/>
+              </a:ln>
+            </p:spPr>
+            <p:style>
+              <a:lnRef idx="1">
+                <a:schemeClr val="accent1"/>
+              </a:lnRef>
+              <a:fillRef idx="0">
+                <a:schemeClr val="accent1"/>
+              </a:fillRef>
+              <a:effectRef idx="0">
+                <a:schemeClr val="accent1"/>
+              </a:effectRef>
+              <a:fontRef idx="minor">
+                <a:schemeClr val="tx1"/>
+              </a:fontRef>
+            </p:style>
+          </p:cxnSp>
+          <p:sp>
+            <p:nvSpPr>
+              <p:cNvPr id="16" name="TextBox 15"/>
+              <p:cNvSpPr txBox="1"/>
+              <p:nvPr/>
+            </p:nvSpPr>
+            <p:spPr>
+              <a:xfrm>
+                <a:off x="3560353" y="2401319"/>
+                <a:ext cx="1383499" cy="400110"/>
+              </a:xfrm>
+              <a:prstGeom prst="rect">
+                <a:avLst/>
+              </a:prstGeom>
+              <a:noFill/>
+              <a:ln w="44450">
+                <a:solidFill>
+                  <a:srgbClr val="00B050"/>
+                </a:solidFill>
+              </a:ln>
+            </p:spPr>
+            <p:txBody>
+              <a:bodyPr wrap="square" rtlCol="0">
+                <a:spAutoFit/>
+              </a:bodyPr>
+              <a:lstStyle/>
+              <a:p>
+                <a:pPr algn="ctr"/>
+                <a:r>
+                  <a:rPr lang="en-US" altLang="ko-KR" sz="2000" dirty="0" smtClean="0">
+                    <a:latin typeface="Arial" charset="0"/>
+                    <a:ea typeface="Arial" charset="0"/>
+                    <a:cs typeface="Arial" charset="0"/>
+                  </a:rPr>
+                  <a:t>EV Agent</a:t>
+                </a:r>
+                <a:endParaRPr lang="ko-KR" altLang="en-US" sz="2000" dirty="0">
+                  <a:latin typeface="Arial" charset="0"/>
+                  <a:ea typeface="Arial" charset="0"/>
+                  <a:cs typeface="Arial" charset="0"/>
+                </a:endParaRPr>
+              </a:p>
+            </p:txBody>
+          </p:sp>
+          <p:sp>
+            <p:nvSpPr>
+              <p:cNvPr id="7" name="번개 33"/>
+              <p:cNvSpPr/>
+              <p:nvPr/>
+            </p:nvSpPr>
+            <p:spPr>
+              <a:xfrm>
+                <a:off x="2928515" y="2130476"/>
+                <a:ext cx="451817" cy="360040"/>
+              </a:xfrm>
+              <a:prstGeom prst="lightningBolt">
+                <a:avLst/>
+              </a:prstGeom>
+              <a:solidFill>
+                <a:srgbClr val="FFFF00"/>
+              </a:solidFill>
+              <a:ln>
+                <a:solidFill>
+                  <a:schemeClr val="tx1"/>
+                </a:solidFill>
+              </a:ln>
+            </p:spPr>
+            <p:style>
+              <a:lnRef idx="2">
+                <a:schemeClr val="accent1">
+                  <a:shade val="50000"/>
+                </a:schemeClr>
+              </a:lnRef>
+              <a:fillRef idx="1">
+                <a:schemeClr val="accent1"/>
+              </a:fillRef>
+              <a:effectRef idx="0">
+                <a:schemeClr val="accent1"/>
+              </a:effectRef>
+              <a:fontRef idx="minor">
+                <a:schemeClr val="lt1"/>
+              </a:fontRef>
+            </p:style>
+            <p:txBody>
+              <a:bodyPr rtlCol="0" anchor="ctr"/>
+              <a:lstStyle/>
+              <a:p>
+                <a:pPr algn="ctr"/>
+                <a:endParaRPr lang="ko-KR" altLang="en-US"/>
+              </a:p>
+            </p:txBody>
+          </p:sp>
+          <p:cxnSp>
+            <p:nvCxnSpPr>
+              <p:cNvPr id="32" name="Straight Arrow Connector 31"/>
+              <p:cNvCxnSpPr/>
+              <p:nvPr/>
+            </p:nvCxnSpPr>
+            <p:spPr>
+              <a:xfrm>
+                <a:off x="5063069" y="2675745"/>
+                <a:ext cx="1799349" cy="0"/>
+              </a:xfrm>
+              <a:prstGeom prst="straightConnector1">
+                <a:avLst/>
+              </a:prstGeom>
+              <a:ln w="25400">
+                <a:solidFill>
+                  <a:schemeClr val="tx1"/>
+                </a:solidFill>
+                <a:tailEnd type="triangle"/>
+              </a:ln>
+            </p:spPr>
+            <p:style>
+              <a:lnRef idx="1">
+                <a:schemeClr val="accent1"/>
+              </a:lnRef>
+              <a:fillRef idx="0">
+                <a:schemeClr val="accent1"/>
+              </a:fillRef>
+              <a:effectRef idx="0">
+                <a:schemeClr val="accent1"/>
+              </a:effectRef>
+              <a:fontRef idx="minor">
+                <a:schemeClr val="tx1"/>
+              </a:fontRef>
+            </p:style>
+          </p:cxnSp>
+          <p:cxnSp>
+            <p:nvCxnSpPr>
+              <p:cNvPr id="35" name="Straight Arrow Connector 34"/>
+              <p:cNvCxnSpPr/>
+              <p:nvPr/>
+            </p:nvCxnSpPr>
+            <p:spPr>
+              <a:xfrm flipH="1">
+                <a:off x="5037342" y="2525207"/>
+                <a:ext cx="1800000" cy="0"/>
+              </a:xfrm>
+              <a:prstGeom prst="straightConnector1">
+                <a:avLst/>
+              </a:prstGeom>
+              <a:ln w="25400">
+                <a:solidFill>
+                  <a:schemeClr val="tx1"/>
+                </a:solidFill>
+                <a:tailEnd type="triangle"/>
+              </a:ln>
+            </p:spPr>
+            <p:style>
+              <a:lnRef idx="1">
+                <a:schemeClr val="accent1"/>
+              </a:lnRef>
+              <a:fillRef idx="0">
+                <a:schemeClr val="accent1"/>
+              </a:fillRef>
+              <a:effectRef idx="0">
+                <a:schemeClr val="accent1"/>
+              </a:effectRef>
+              <a:fontRef idx="minor">
+                <a:schemeClr val="tx1"/>
+              </a:fontRef>
+            </p:style>
+          </p:cxnSp>
+          <p:sp>
+            <p:nvSpPr>
+              <p:cNvPr id="36" name="TextBox 35"/>
+              <p:cNvSpPr txBox="1"/>
+              <p:nvPr/>
+            </p:nvSpPr>
+            <p:spPr>
+              <a:xfrm>
+                <a:off x="5207002" y="2155877"/>
+                <a:ext cx="1655416" cy="369332"/>
+              </a:xfrm>
+              <a:prstGeom prst="rect">
+                <a:avLst/>
+              </a:prstGeom>
+              <a:noFill/>
+            </p:spPr>
+            <p:txBody>
+              <a:bodyPr wrap="square" rtlCol="0">
+                <a:spAutoFit/>
+              </a:bodyPr>
+              <a:lstStyle/>
+              <a:p>
+                <a:pPr algn="ctr"/>
+                <a:r>
+                  <a:rPr lang="en-US" dirty="0" smtClean="0">
+                    <a:latin typeface="Arial" charset="0"/>
+                    <a:ea typeface="Arial" charset="0"/>
+                    <a:cs typeface="Arial" charset="0"/>
+                  </a:rPr>
+                  <a:t>Information</a:t>
+                </a:r>
+                <a:endParaRPr lang="en-US" dirty="0">
+                  <a:latin typeface="Arial" charset="0"/>
+                  <a:ea typeface="Arial" charset="0"/>
+                  <a:cs typeface="Arial" charset="0"/>
+                </a:endParaRPr>
+              </a:p>
+            </p:txBody>
+          </p:sp>
+          <p:sp>
+            <p:nvSpPr>
+              <p:cNvPr id="37" name="TextBox 36"/>
+              <p:cNvSpPr txBox="1"/>
+              <p:nvPr/>
+            </p:nvSpPr>
+            <p:spPr>
+              <a:xfrm>
+                <a:off x="5207002" y="2662584"/>
+                <a:ext cx="1655416" cy="369332"/>
+              </a:xfrm>
+              <a:prstGeom prst="rect">
+                <a:avLst/>
+              </a:prstGeom>
+              <a:noFill/>
+            </p:spPr>
+            <p:txBody>
+              <a:bodyPr wrap="square" rtlCol="0">
+                <a:spAutoFit/>
+              </a:bodyPr>
+              <a:lstStyle/>
+              <a:p>
+                <a:pPr algn="ctr"/>
+                <a:r>
+                  <a:rPr lang="en-US" dirty="0" smtClean="0">
+                    <a:latin typeface="Arial" charset="0"/>
+                    <a:ea typeface="Arial" charset="0"/>
+                    <a:cs typeface="Arial" charset="0"/>
+                  </a:rPr>
+                  <a:t>Charging Plan</a:t>
+                </a:r>
+                <a:endParaRPr lang="en-US" dirty="0">
+                  <a:latin typeface="Arial" charset="0"/>
+                  <a:ea typeface="Arial" charset="0"/>
+                  <a:cs typeface="Arial" charset="0"/>
+                </a:endParaRPr>
+              </a:p>
+            </p:txBody>
+          </p:sp>
+          <p:cxnSp>
+            <p:nvCxnSpPr>
+              <p:cNvPr id="39" name="Straight Arrow Connector 38"/>
+              <p:cNvCxnSpPr/>
+              <p:nvPr/>
+            </p:nvCxnSpPr>
+            <p:spPr>
+              <a:xfrm flipV="1">
+                <a:off x="5037342" y="1591733"/>
+                <a:ext cx="846000" cy="720000"/>
+              </a:xfrm>
+              <a:prstGeom prst="straightConnector1">
+                <a:avLst/>
+              </a:prstGeom>
+              <a:ln w="25400">
+                <a:solidFill>
+                  <a:schemeClr val="tx1"/>
+                </a:solidFill>
+                <a:headEnd type="triangle"/>
+                <a:tailEnd type="triangle"/>
+              </a:ln>
+            </p:spPr>
+            <p:style>
+              <a:lnRef idx="1">
+                <a:schemeClr val="accent1"/>
+              </a:lnRef>
+              <a:fillRef idx="0">
+                <a:schemeClr val="accent1"/>
+              </a:fillRef>
+              <a:effectRef idx="0">
+                <a:schemeClr val="accent1"/>
+              </a:effectRef>
+              <a:fontRef idx="minor">
+                <a:schemeClr val="tx1"/>
+              </a:fontRef>
+            </p:style>
+          </p:cxnSp>
+          <p:cxnSp>
+            <p:nvCxnSpPr>
+              <p:cNvPr id="41" name="Straight Arrow Connector 40"/>
+              <p:cNvCxnSpPr/>
+              <p:nvPr/>
+            </p:nvCxnSpPr>
+            <p:spPr>
+              <a:xfrm>
+                <a:off x="5037342" y="2894883"/>
+                <a:ext cx="846000" cy="720000"/>
+              </a:xfrm>
+              <a:prstGeom prst="straightConnector1">
+                <a:avLst/>
+              </a:prstGeom>
+              <a:ln w="25400">
+                <a:solidFill>
+                  <a:schemeClr val="tx1"/>
+                </a:solidFill>
+                <a:headEnd type="triangle"/>
+                <a:tailEnd type="triangle"/>
+              </a:ln>
+            </p:spPr>
+            <p:style>
+              <a:lnRef idx="1">
+                <a:schemeClr val="accent1"/>
+              </a:lnRef>
+              <a:fillRef idx="0">
+                <a:schemeClr val="accent1"/>
+              </a:fillRef>
+              <a:effectRef idx="0">
+                <a:schemeClr val="accent1"/>
+              </a:effectRef>
+              <a:fontRef idx="minor">
+                <a:schemeClr val="tx1"/>
+              </a:fontRef>
+            </p:style>
+          </p:cxnSp>
+        </p:grpSp>
+        <p:sp>
+          <p:nvSpPr>
+            <p:cNvPr id="2" name="Rectangle 1"/>
+            <p:cNvSpPr/>
+            <p:nvPr/>
+          </p:nvSpPr>
+          <p:spPr>
+            <a:xfrm>
+              <a:off x="3445933" y="519717"/>
+              <a:ext cx="5334284" cy="4224867"/>
+            </a:xfrm>
+            <a:prstGeom prst="rect">
+              <a:avLst/>
+            </a:prstGeom>
+            <a:noFill/>
+            <a:ln w="25400">
+              <a:solidFill>
+                <a:srgbClr val="FF0000"/>
+              </a:solidFill>
+              <a:prstDash val="dash"/>
+            </a:ln>
+          </p:spPr>
+          <p:style>
+            <a:lnRef idx="2">
+              <a:schemeClr val="accent1">
+                <a:shade val="50000"/>
+              </a:schemeClr>
+            </a:lnRef>
+            <a:fillRef idx="1">
+              <a:schemeClr val="accent1"/>
+            </a:fillRef>
+            <a:effectRef idx="0">
+              <a:schemeClr val="accent1"/>
+            </a:effectRef>
+            <a:fontRef idx="minor">
+              <a:schemeClr val="lt1"/>
+            </a:fontRef>
+          </p:style>
+          <p:txBody>
+            <a:bodyPr rtlCol="0" anchor="ctr"/>
+            <a:lstStyle/>
+            <a:p>
+              <a:pPr algn="ctr"/>
+              <a:endParaRPr lang="en-US"/>
+            </a:p>
+          </p:txBody>
+        </p:sp>
+        <p:sp>
+          <p:nvSpPr>
+            <p:cNvPr id="3" name="TextBox 2"/>
+            <p:cNvSpPr txBox="1"/>
+            <p:nvPr/>
+          </p:nvSpPr>
+          <p:spPr>
+            <a:xfrm>
+              <a:off x="5325674" y="148859"/>
+              <a:ext cx="1574802" cy="338554"/>
+            </a:xfrm>
+            <a:prstGeom prst="rect">
+              <a:avLst/>
+            </a:prstGeom>
+            <a:noFill/>
+          </p:spPr>
+          <p:txBody>
+            <a:bodyPr wrap="square" rtlCol="0">
+              <a:spAutoFit/>
+            </a:bodyPr>
+            <a:lstStyle/>
+            <a:p>
+              <a:pPr algn="ctr"/>
+              <a:r>
+                <a:rPr lang="en-US" sz="1600" dirty="0" smtClean="0">
+                  <a:solidFill>
+                    <a:srgbClr val="FF0000"/>
+                  </a:solidFill>
+                  <a:latin typeface="Arial" charset="0"/>
+                  <a:ea typeface="Arial" charset="0"/>
+                  <a:cs typeface="Arial" charset="0"/>
+                </a:rPr>
+                <a:t>EV </a:t>
+              </a:r>
+              <a:r>
+                <a:rPr lang="en-US" sz="1600" dirty="0" err="1" smtClean="0">
+                  <a:solidFill>
+                    <a:srgbClr val="FF0000"/>
+                  </a:solidFill>
+                  <a:latin typeface="Arial" charset="0"/>
+                  <a:ea typeface="Arial" charset="0"/>
+                  <a:cs typeface="Arial" charset="0"/>
+                </a:rPr>
+                <a:t>Microgrid</a:t>
+              </a:r>
+              <a:endParaRPr lang="en-US" sz="1600" dirty="0">
+                <a:solidFill>
+                  <a:srgbClr val="FF0000"/>
+                </a:solidFill>
+                <a:latin typeface="Arial" charset="0"/>
+                <a:ea typeface="Arial" charset="0"/>
+                <a:cs typeface="Arial" charset="0"/>
+              </a:endParaRPr>
+            </a:p>
+          </p:txBody>
+        </p:sp>
+        <p:sp>
+          <p:nvSpPr>
+            <p:cNvPr id="18" name="TextBox 17"/>
+            <p:cNvSpPr txBox="1"/>
+            <p:nvPr/>
+          </p:nvSpPr>
+          <p:spPr>
+            <a:xfrm>
+              <a:off x="1965208" y="1210287"/>
+              <a:ext cx="1231593" cy="584775"/>
+            </a:xfrm>
+            <a:prstGeom prst="rect">
+              <a:avLst/>
+            </a:prstGeom>
+            <a:noFill/>
+          </p:spPr>
+          <p:txBody>
+            <a:bodyPr wrap="square" rtlCol="0">
+              <a:spAutoFit/>
+            </a:bodyPr>
+            <a:lstStyle/>
+            <a:p>
+              <a:pPr algn="ctr"/>
+              <a:r>
+                <a:rPr lang="en-US" sz="1600" dirty="0" smtClean="0">
+                  <a:latin typeface="Arial" charset="0"/>
+                  <a:ea typeface="Arial" charset="0"/>
+                  <a:cs typeface="Arial" charset="0"/>
+                </a:rPr>
+                <a:t>Grid</a:t>
+              </a:r>
+            </a:p>
+            <a:p>
+              <a:pPr algn="ctr"/>
+              <a:r>
+                <a:rPr lang="en-US" sz="1600" dirty="0" smtClean="0">
+                  <a:latin typeface="Arial" charset="0"/>
+                  <a:ea typeface="Arial" charset="0"/>
+                  <a:cs typeface="Arial" charset="0"/>
+                </a:rPr>
+                <a:t>(</a:t>
+              </a:r>
+              <a:r>
+                <a:rPr lang="en-US" sz="1600" dirty="0" err="1" smtClean="0">
+                  <a:latin typeface="Arial" charset="0"/>
+                  <a:ea typeface="Arial" charset="0"/>
+                  <a:cs typeface="Arial" charset="0"/>
+                </a:rPr>
+                <a:t>Macrogrid</a:t>
+              </a:r>
+              <a:r>
+                <a:rPr lang="en-US" sz="1600" dirty="0" smtClean="0">
+                  <a:latin typeface="Arial" charset="0"/>
+                  <a:ea typeface="Arial" charset="0"/>
+                  <a:cs typeface="Arial" charset="0"/>
+                </a:rPr>
+                <a:t>)</a:t>
+              </a:r>
+              <a:endParaRPr lang="en-US" sz="1600" dirty="0">
+                <a:latin typeface="Arial" charset="0"/>
+                <a:ea typeface="Arial" charset="0"/>
+                <a:cs typeface="Arial" charset="0"/>
+              </a:endParaRPr>
+            </a:p>
+          </p:txBody>
+        </p:sp>
+      </p:grpSp>
+    </p:spTree>
+    <p:extLst>
+      <p:ext uri="{BB962C8B-B14F-4D97-AF65-F5344CB8AC3E}">
+        <p14:creationId xmlns:p14="http://schemas.microsoft.com/office/powerpoint/2010/main" val="945319310"/>
+      </p:ext>
+    </p:extLst>
+  </p:cSld>
+  <p:clrMapOvr>
+    <a:masterClrMapping/>
+  </p:clrMapOvr>
+</p:sld>
+</file>
+
 <file path=ppt/theme/theme1.xml><?xml version="1.0" encoding="utf-8"?>
 <a:theme xmlns:a="http://schemas.openxmlformats.org/drawingml/2006/main" name="Office Theme">
   <a:themeElements>

</xml_diff>